<commit_message>
Slides 9 update 2
</commit_message>
<xml_diff>
--- a/slides/Chapter 9.pptx
+++ b/slides/Chapter 9.pptx
@@ -12,6 +12,12 @@
     <p:sldId id="260" r:id="rId6"/>
     <p:sldId id="261" r:id="rId7"/>
     <p:sldId id="262" r:id="rId8"/>
+    <p:sldId id="263" r:id="rId9"/>
+    <p:sldId id="264" r:id="rId10"/>
+    <p:sldId id="265" r:id="rId11"/>
+    <p:sldId id="267" r:id="rId12"/>
+    <p:sldId id="266" r:id="rId13"/>
+    <p:sldId id="268" r:id="rId14"/>
   </p:sldIdLst>
   <p:sldSz cx="12192000" cy="6858000"/>
   <p:notesSz cx="6858000" cy="9144000"/>
@@ -3052,6 +3058,508 @@
 </p:sld>
 </file>
 
+<file path=ppt/slides/slide10.xml><?xml version="1.0" encoding="utf-8"?>
+<p:sld xmlns:a="http://schemas.openxmlformats.org/drawingml/2006/main" xmlns:r="http://schemas.openxmlformats.org/officeDocument/2006/relationships" xmlns:p="http://schemas.openxmlformats.org/presentationml/2006/main">
+  <p:cSld>
+    <p:spTree>
+      <p:nvGrpSpPr>
+        <p:cNvPr id="1" name=""/>
+        <p:cNvGrpSpPr/>
+        <p:nvPr/>
+      </p:nvGrpSpPr>
+      <p:grpSpPr>
+        <a:xfrm>
+          <a:off x="0" y="0"/>
+          <a:ext cx="0" cy="0"/>
+          <a:chOff x="0" y="0"/>
+          <a:chExt cx="0" cy="0"/>
+        </a:xfrm>
+      </p:grpSpPr>
+      <p:sp>
+        <p:nvSpPr>
+          <p:cNvPr id="2" name="Title 1">
+            <a:extLst>
+              <a:ext uri="{FF2B5EF4-FFF2-40B4-BE49-F238E27FC236}">
+                <a16:creationId xmlns:a16="http://schemas.microsoft.com/office/drawing/2014/main" id="{B7BFC092-5860-4555-BB5E-189F0C7EA7F4}"/>
+              </a:ext>
+            </a:extLst>
+          </p:cNvPr>
+          <p:cNvSpPr>
+            <a:spLocks noGrp="1"/>
+          </p:cNvSpPr>
+          <p:nvPr>
+            <p:ph type="title"/>
+          </p:nvPr>
+        </p:nvSpPr>
+        <p:spPr/>
+        <p:txBody>
+          <a:bodyPr/>
+          <a:lstStyle/>
+          <a:p>
+            <a:r>
+              <a:rPr lang="en-US" dirty="0"/>
+              <a:t>Eye tracking</a:t>
+            </a:r>
+          </a:p>
+        </p:txBody>
+      </p:sp>
+      <p:sp>
+        <p:nvSpPr>
+          <p:cNvPr id="3" name="Content Placeholder 2">
+            <a:extLst>
+              <a:ext uri="{FF2B5EF4-FFF2-40B4-BE49-F238E27FC236}">
+                <a16:creationId xmlns:a16="http://schemas.microsoft.com/office/drawing/2014/main" id="{6D946212-B9A2-4107-864B-89CCA0437383}"/>
+              </a:ext>
+            </a:extLst>
+          </p:cNvPr>
+          <p:cNvSpPr>
+            <a:spLocks noGrp="1"/>
+          </p:cNvSpPr>
+          <p:nvPr>
+            <p:ph idx="1"/>
+          </p:nvPr>
+        </p:nvSpPr>
+        <p:spPr/>
+        <p:txBody>
+          <a:bodyPr/>
+          <a:lstStyle/>
+          <a:p>
+            <a:r>
+              <a:rPr lang="en-US" dirty="0"/>
+              <a:t>electro-oculography – puts electrodes on the muscles around the eye</a:t>
+            </a:r>
+          </a:p>
+          <a:p>
+            <a:r>
+              <a:rPr lang="en-US" dirty="0"/>
+              <a:t>Electromagnetic contact lenses</a:t>
+            </a:r>
+          </a:p>
+          <a:p>
+            <a:r>
+              <a:rPr lang="en-US" dirty="0"/>
+              <a:t>Video oculography – shine inferred into the eye and measures the refraction</a:t>
+            </a:r>
+          </a:p>
+          <a:p>
+            <a:endParaRPr lang="en-US" dirty="0"/>
+          </a:p>
+          <a:p>
+            <a:endParaRPr lang="en-US" dirty="0"/>
+          </a:p>
+        </p:txBody>
+      </p:sp>
+    </p:spTree>
+    <p:extLst>
+      <p:ext uri="{BB962C8B-B14F-4D97-AF65-F5344CB8AC3E}">
+        <p14:creationId xmlns:p14="http://schemas.microsoft.com/office/powerpoint/2010/main" val="1461110390"/>
+      </p:ext>
+    </p:extLst>
+  </p:cSld>
+  <p:clrMapOvr>
+    <a:masterClrMapping/>
+  </p:clrMapOvr>
+</p:sld>
+</file>
+
+<file path=ppt/slides/slide11.xml><?xml version="1.0" encoding="utf-8"?>
+<p:sld xmlns:a="http://schemas.openxmlformats.org/drawingml/2006/main" xmlns:r="http://schemas.openxmlformats.org/officeDocument/2006/relationships" xmlns:p="http://schemas.openxmlformats.org/presentationml/2006/main">
+  <p:cSld>
+    <p:spTree>
+      <p:nvGrpSpPr>
+        <p:cNvPr id="1" name=""/>
+        <p:cNvGrpSpPr/>
+        <p:nvPr/>
+      </p:nvGrpSpPr>
+      <p:grpSpPr>
+        <a:xfrm>
+          <a:off x="0" y="0"/>
+          <a:ext cx="0" cy="0"/>
+          <a:chOff x="0" y="0"/>
+          <a:chExt cx="0" cy="0"/>
+        </a:xfrm>
+      </p:grpSpPr>
+      <p:sp>
+        <p:nvSpPr>
+          <p:cNvPr id="2" name="Title 1">
+            <a:extLst>
+              <a:ext uri="{FF2B5EF4-FFF2-40B4-BE49-F238E27FC236}">
+                <a16:creationId xmlns:a16="http://schemas.microsoft.com/office/drawing/2014/main" id="{6BC1380D-CDF5-4C25-96CE-7B17611F660F}"/>
+              </a:ext>
+            </a:extLst>
+          </p:cNvPr>
+          <p:cNvSpPr>
+            <a:spLocks noGrp="1"/>
+          </p:cNvSpPr>
+          <p:nvPr>
+            <p:ph type="title"/>
+          </p:nvPr>
+        </p:nvSpPr>
+        <p:spPr/>
+        <p:txBody>
+          <a:bodyPr/>
+          <a:lstStyle/>
+          <a:p>
+            <a:r>
+              <a:rPr lang="en-US" dirty="0"/>
+              <a:t>Tracking Attached bodies</a:t>
+            </a:r>
+          </a:p>
+        </p:txBody>
+      </p:sp>
+      <p:sp>
+        <p:nvSpPr>
+          <p:cNvPr id="3" name="Content Placeholder 2">
+            <a:extLst>
+              <a:ext uri="{FF2B5EF4-FFF2-40B4-BE49-F238E27FC236}">
+                <a16:creationId xmlns:a16="http://schemas.microsoft.com/office/drawing/2014/main" id="{81B69B81-2763-4A9C-955D-B98888975A39}"/>
+              </a:ext>
+            </a:extLst>
+          </p:cNvPr>
+          <p:cNvSpPr>
+            <a:spLocks noGrp="1"/>
+          </p:cNvSpPr>
+          <p:nvPr>
+            <p:ph idx="1"/>
+          </p:nvPr>
+        </p:nvSpPr>
+        <p:spPr/>
+        <p:txBody>
+          <a:bodyPr/>
+          <a:lstStyle/>
+          <a:p>
+            <a:r>
+              <a:rPr lang="en-US" dirty="0"/>
+              <a:t>Forward Kinematics – the summation of eye and head tracking</a:t>
+            </a:r>
+            <a:br>
+              <a:rPr lang="en-US" dirty="0"/>
+            </a:br>
+            <a:r>
+              <a:rPr lang="en-US" dirty="0"/>
+              <a:t>using the size and transform of each component the entire object can be correctly determined in space</a:t>
+            </a:r>
+          </a:p>
+          <a:p>
+            <a:r>
+              <a:rPr lang="en-US" dirty="0"/>
+              <a:t>Inverse Kinematics – using the known end point to transform the other axis’</a:t>
+            </a:r>
+            <a:br>
+              <a:rPr lang="en-US" dirty="0"/>
+            </a:br>
+            <a:r>
+              <a:rPr lang="en-US" dirty="0"/>
+              <a:t>	ambiguous positions can happen. </a:t>
+            </a:r>
+          </a:p>
+        </p:txBody>
+      </p:sp>
+    </p:spTree>
+    <p:extLst>
+      <p:ext uri="{BB962C8B-B14F-4D97-AF65-F5344CB8AC3E}">
+        <p14:creationId xmlns:p14="http://schemas.microsoft.com/office/powerpoint/2010/main" val="832492616"/>
+      </p:ext>
+    </p:extLst>
+  </p:cSld>
+  <p:clrMapOvr>
+    <a:masterClrMapping/>
+  </p:clrMapOvr>
+</p:sld>
+</file>
+
+<file path=ppt/slides/slide12.xml><?xml version="1.0" encoding="utf-8"?>
+<p:sld xmlns:a="http://schemas.openxmlformats.org/drawingml/2006/main" xmlns:r="http://schemas.openxmlformats.org/officeDocument/2006/relationships" xmlns:p="http://schemas.openxmlformats.org/presentationml/2006/main">
+  <p:cSld>
+    <p:bg>
+      <p:bgPr>
+        <a:solidFill>
+          <a:schemeClr val="bg1"/>
+        </a:solidFill>
+        <a:effectLst/>
+      </p:bgPr>
+    </p:bg>
+    <p:spTree>
+      <p:nvGrpSpPr>
+        <p:cNvPr id="1" name=""/>
+        <p:cNvGrpSpPr/>
+        <p:nvPr/>
+      </p:nvGrpSpPr>
+      <p:grpSpPr>
+        <a:xfrm>
+          <a:off x="0" y="0"/>
+          <a:ext cx="0" cy="0"/>
+          <a:chOff x="0" y="0"/>
+          <a:chExt cx="0" cy="0"/>
+        </a:xfrm>
+      </p:grpSpPr>
+      <p:sp>
+        <p:nvSpPr>
+          <p:cNvPr id="9" name="Rectangle 8">
+            <a:extLst>
+              <a:ext uri="{FF2B5EF4-FFF2-40B4-BE49-F238E27FC236}">
+                <a16:creationId xmlns:a16="http://schemas.microsoft.com/office/drawing/2014/main" id="{32BC26D8-82FB-445E-AA49-62A77D7C1EE0}"/>
+              </a:ext>
+              <a:ext uri="{C183D7F6-B498-43B3-948B-1728B52AA6E4}">
+                <adec:decorative xmlns:adec="http://schemas.microsoft.com/office/drawing/2017/decorative" val="1"/>
+              </a:ext>
+            </a:extLst>
+          </p:cNvPr>
+          <p:cNvSpPr>
+            <a:spLocks noGrp="1" noRot="1" noChangeAspect="1" noMove="1" noResize="1" noEditPoints="1" noAdjustHandles="1" noChangeArrowheads="1" noChangeShapeType="1" noTextEdit="1"/>
+          </p:cNvSpPr>
+          <p:nvPr>
+            <p:extLst>
+              <p:ext uri="{386F3935-93C4-4BCD-93E2-E3B085C9AB24}">
+                <p16:designElem xmlns:p16="http://schemas.microsoft.com/office/powerpoint/2015/main" val="1"/>
+              </p:ext>
+            </p:extLst>
+          </p:nvPr>
+        </p:nvSpPr>
+        <p:spPr>
+          <a:xfrm>
+            <a:off x="0" y="0"/>
+            <a:ext cx="12192000" cy="6858000"/>
+          </a:xfrm>
+          <a:prstGeom prst="rect">
+            <a:avLst/>
+          </a:prstGeom>
+          <a:solidFill>
+            <a:srgbClr val="1C5F4B"/>
+          </a:solidFill>
+          <a:ln>
+            <a:noFill/>
+          </a:ln>
+        </p:spPr>
+        <p:style>
+          <a:lnRef idx="2">
+            <a:schemeClr val="accent1">
+              <a:shade val="50000"/>
+            </a:schemeClr>
+          </a:lnRef>
+          <a:fillRef idx="1">
+            <a:schemeClr val="accent1"/>
+          </a:fillRef>
+          <a:effectRef idx="0">
+            <a:schemeClr val="accent1"/>
+          </a:effectRef>
+          <a:fontRef idx="minor">
+            <a:schemeClr val="lt1"/>
+          </a:fontRef>
+        </p:style>
+        <p:txBody>
+          <a:bodyPr rtlCol="0" anchor="ctr"/>
+          <a:lstStyle/>
+          <a:p>
+            <a:pPr algn="ctr"/>
+            <a:endParaRPr lang="en-US"/>
+          </a:p>
+        </p:txBody>
+      </p:sp>
+      <p:sp>
+        <p:nvSpPr>
+          <p:cNvPr id="11" name="Rectangle 10">
+            <a:extLst>
+              <a:ext uri="{FF2B5EF4-FFF2-40B4-BE49-F238E27FC236}">
+                <a16:creationId xmlns:a16="http://schemas.microsoft.com/office/drawing/2014/main" id="{CB44330D-EA18-4254-AA95-EB49948539B8}"/>
+              </a:ext>
+              <a:ext uri="{C183D7F6-B498-43B3-948B-1728B52AA6E4}">
+                <adec:decorative xmlns:adec="http://schemas.microsoft.com/office/drawing/2017/decorative" val="1"/>
+              </a:ext>
+            </a:extLst>
+          </p:cNvPr>
+          <p:cNvSpPr>
+            <a:spLocks noGrp="1" noRot="1" noChangeAspect="1" noMove="1" noResize="1" noEditPoints="1" noAdjustHandles="1" noChangeArrowheads="1" noChangeShapeType="1" noTextEdit="1"/>
+          </p:cNvSpPr>
+          <p:nvPr>
+            <p:extLst>
+              <p:ext uri="{386F3935-93C4-4BCD-93E2-E3B085C9AB24}">
+                <p16:designElem xmlns:p16="http://schemas.microsoft.com/office/powerpoint/2015/main" val="1"/>
+              </p:ext>
+            </p:extLst>
+          </p:nvPr>
+        </p:nvSpPr>
+        <p:spPr>
+          <a:xfrm>
+            <a:off x="477012" y="480060"/>
+            <a:ext cx="11237976" cy="5897880"/>
+          </a:xfrm>
+          <a:prstGeom prst="rect">
+            <a:avLst/>
+          </a:prstGeom>
+          <a:solidFill>
+            <a:srgbClr val="FFFFFF"/>
+          </a:solidFill>
+          <a:ln>
+            <a:noFill/>
+          </a:ln>
+        </p:spPr>
+        <p:style>
+          <a:lnRef idx="2">
+            <a:schemeClr val="accent1">
+              <a:shade val="50000"/>
+            </a:schemeClr>
+          </a:lnRef>
+          <a:fillRef idx="1">
+            <a:schemeClr val="accent1"/>
+          </a:fillRef>
+          <a:effectRef idx="0">
+            <a:schemeClr val="accent1"/>
+          </a:effectRef>
+          <a:fontRef idx="minor">
+            <a:schemeClr val="lt1"/>
+          </a:fontRef>
+        </p:style>
+        <p:txBody>
+          <a:bodyPr rtlCol="0" anchor="ctr"/>
+          <a:lstStyle/>
+          <a:p>
+            <a:pPr algn="ctr"/>
+            <a:endParaRPr lang="en-US"/>
+          </a:p>
+        </p:txBody>
+      </p:sp>
+      <p:pic>
+        <p:nvPicPr>
+          <p:cNvPr id="4" name="Content Placeholder 3">
+            <a:extLst>
+              <a:ext uri="{FF2B5EF4-FFF2-40B4-BE49-F238E27FC236}">
+                <a16:creationId xmlns:a16="http://schemas.microsoft.com/office/drawing/2014/main" id="{6AF0238E-2683-4C83-B385-3F40C5CE077A}"/>
+              </a:ext>
+            </a:extLst>
+          </p:cNvPr>
+          <p:cNvPicPr>
+            <a:picLocks noGrp="1" noChangeAspect="1"/>
+          </p:cNvPicPr>
+          <p:nvPr>
+            <p:ph idx="1"/>
+          </p:nvPr>
+        </p:nvPicPr>
+        <p:blipFill>
+          <a:blip r:embed="rId2"/>
+          <a:stretch>
+            <a:fillRect/>
+          </a:stretch>
+        </p:blipFill>
+        <p:spPr>
+          <a:xfrm>
+            <a:off x="2240590" y="643467"/>
+            <a:ext cx="7710819" cy="5571066"/>
+          </a:xfrm>
+          <a:prstGeom prst="rect">
+            <a:avLst/>
+          </a:prstGeom>
+        </p:spPr>
+      </p:pic>
+    </p:spTree>
+    <p:extLst>
+      <p:ext uri="{BB962C8B-B14F-4D97-AF65-F5344CB8AC3E}">
+        <p14:creationId xmlns:p14="http://schemas.microsoft.com/office/powerpoint/2010/main" val="3793600766"/>
+      </p:ext>
+    </p:extLst>
+  </p:cSld>
+  <p:clrMapOvr>
+    <a:masterClrMapping/>
+  </p:clrMapOvr>
+</p:sld>
+</file>
+
+<file path=ppt/slides/slide13.xml><?xml version="1.0" encoding="utf-8"?>
+<p:sld xmlns:a="http://schemas.openxmlformats.org/drawingml/2006/main" xmlns:r="http://schemas.openxmlformats.org/officeDocument/2006/relationships" xmlns:p="http://schemas.openxmlformats.org/presentationml/2006/main">
+  <p:cSld>
+    <p:spTree>
+      <p:nvGrpSpPr>
+        <p:cNvPr id="1" name=""/>
+        <p:cNvGrpSpPr/>
+        <p:nvPr/>
+      </p:nvGrpSpPr>
+      <p:grpSpPr>
+        <a:xfrm>
+          <a:off x="0" y="0"/>
+          <a:ext cx="0" cy="0"/>
+          <a:chOff x="0" y="0"/>
+          <a:chExt cx="0" cy="0"/>
+        </a:xfrm>
+      </p:grpSpPr>
+      <p:sp>
+        <p:nvSpPr>
+          <p:cNvPr id="2" name="Title 1">
+            <a:extLst>
+              <a:ext uri="{FF2B5EF4-FFF2-40B4-BE49-F238E27FC236}">
+                <a16:creationId xmlns:a16="http://schemas.microsoft.com/office/drawing/2014/main" id="{D59DE701-65A8-4B20-A65F-BE33B15B6C92}"/>
+              </a:ext>
+            </a:extLst>
+          </p:cNvPr>
+          <p:cNvSpPr>
+            <a:spLocks noGrp="1"/>
+          </p:cNvSpPr>
+          <p:nvPr>
+            <p:ph type="title"/>
+          </p:nvPr>
+        </p:nvSpPr>
+        <p:spPr/>
+        <p:txBody>
+          <a:bodyPr/>
+          <a:lstStyle/>
+          <a:p>
+            <a:r>
+              <a:rPr lang="en-US" dirty="0"/>
+              <a:t>3D scanning</a:t>
+            </a:r>
+          </a:p>
+        </p:txBody>
+      </p:sp>
+      <p:sp>
+        <p:nvSpPr>
+          <p:cNvPr id="3" name="Content Placeholder 2">
+            <a:extLst>
+              <a:ext uri="{FF2B5EF4-FFF2-40B4-BE49-F238E27FC236}">
+                <a16:creationId xmlns:a16="http://schemas.microsoft.com/office/drawing/2014/main" id="{2D38856A-FD12-4E75-8A9E-722397979F80}"/>
+              </a:ext>
+            </a:extLst>
+          </p:cNvPr>
+          <p:cNvSpPr>
+            <a:spLocks noGrp="1"/>
+          </p:cNvSpPr>
+          <p:nvPr>
+            <p:ph idx="1"/>
+          </p:nvPr>
+        </p:nvSpPr>
+        <p:spPr/>
+        <p:txBody>
+          <a:bodyPr/>
+          <a:lstStyle/>
+          <a:p>
+            <a:r>
+              <a:rPr lang="en-US" dirty="0"/>
+              <a:t>Stereo cameras get position  and depth information</a:t>
+            </a:r>
+          </a:p>
+          <a:p>
+            <a:r>
+              <a:rPr lang="en-US" dirty="0"/>
+              <a:t>Panoramic stitching can be used to </a:t>
+            </a:r>
+            <a:r>
+              <a:rPr lang="en-US"/>
+              <a:t>get full 360 scan</a:t>
+            </a:r>
+          </a:p>
+        </p:txBody>
+      </p:sp>
+    </p:spTree>
+    <p:extLst>
+      <p:ext uri="{BB962C8B-B14F-4D97-AF65-F5344CB8AC3E}">
+        <p14:creationId xmlns:p14="http://schemas.microsoft.com/office/powerpoint/2010/main" val="3286235829"/>
+      </p:ext>
+    </p:extLst>
+  </p:cSld>
+  <p:clrMapOvr>
+    <a:masterClrMapping/>
+  </p:clrMapOvr>
+</p:sld>
+</file>
+
 <file path=ppt/slides/slide2.xml><?xml version="1.0" encoding="utf-8"?>
 <p:sld xmlns:a="http://schemas.openxmlformats.org/drawingml/2006/main" xmlns:r="http://schemas.openxmlformats.org/officeDocument/2006/relationships" xmlns:p="http://schemas.openxmlformats.org/presentationml/2006/main">
   <p:cSld>
@@ -4068,6 +4576,244 @@
     <p:extLst>
       <p:ext uri="{BB962C8B-B14F-4D97-AF65-F5344CB8AC3E}">
         <p14:creationId xmlns:p14="http://schemas.microsoft.com/office/powerpoint/2010/main" val="2238931701"/>
+      </p:ext>
+    </p:extLst>
+  </p:cSld>
+  <p:clrMapOvr>
+    <a:masterClrMapping/>
+  </p:clrMapOvr>
+</p:sld>
+</file>
+
+<file path=ppt/slides/slide8.xml><?xml version="1.0" encoding="utf-8"?>
+<p:sld xmlns:a="http://schemas.openxmlformats.org/drawingml/2006/main" xmlns:r="http://schemas.openxmlformats.org/officeDocument/2006/relationships" xmlns:p="http://schemas.openxmlformats.org/presentationml/2006/main">
+  <p:cSld>
+    <p:spTree>
+      <p:nvGrpSpPr>
+        <p:cNvPr id="1" name=""/>
+        <p:cNvGrpSpPr/>
+        <p:nvPr/>
+      </p:nvGrpSpPr>
+      <p:grpSpPr>
+        <a:xfrm>
+          <a:off x="0" y="0"/>
+          <a:ext cx="0" cy="0"/>
+          <a:chOff x="0" y="0"/>
+          <a:chExt cx="0" cy="0"/>
+        </a:xfrm>
+      </p:grpSpPr>
+      <p:sp>
+        <p:nvSpPr>
+          <p:cNvPr id="2" name="Title 1">
+            <a:extLst>
+              <a:ext uri="{FF2B5EF4-FFF2-40B4-BE49-F238E27FC236}">
+                <a16:creationId xmlns:a16="http://schemas.microsoft.com/office/drawing/2014/main" id="{56C59ADC-C201-4D4B-BD0E-9AD56EBD2158}"/>
+              </a:ext>
+            </a:extLst>
+          </p:cNvPr>
+          <p:cNvSpPr>
+            <a:spLocks noGrp="1"/>
+          </p:cNvSpPr>
+          <p:nvPr>
+            <p:ph type="title"/>
+          </p:nvPr>
+        </p:nvSpPr>
+        <p:spPr/>
+        <p:txBody>
+          <a:bodyPr/>
+          <a:lstStyle/>
+          <a:p>
+            <a:r>
+              <a:rPr lang="en-US" dirty="0"/>
+              <a:t>Point Tracking</a:t>
+            </a:r>
+          </a:p>
+        </p:txBody>
+      </p:sp>
+      <p:sp>
+        <p:nvSpPr>
+          <p:cNvPr id="3" name="Content Placeholder 2">
+            <a:extLst>
+              <a:ext uri="{FF2B5EF4-FFF2-40B4-BE49-F238E27FC236}">
+                <a16:creationId xmlns:a16="http://schemas.microsoft.com/office/drawing/2014/main" id="{B2EDE3E3-DAEF-46C0-8A99-CB5435A4A6D9}"/>
+              </a:ext>
+            </a:extLst>
+          </p:cNvPr>
+          <p:cNvSpPr>
+            <a:spLocks noGrp="1"/>
+          </p:cNvSpPr>
+          <p:nvPr>
+            <p:ph idx="1"/>
+          </p:nvPr>
+        </p:nvSpPr>
+        <p:spPr/>
+        <p:txBody>
+          <a:bodyPr/>
+          <a:lstStyle/>
+          <a:p>
+            <a:r>
+              <a:rPr lang="en-US" dirty="0"/>
+              <a:t>Natural Feature – objects in the environment that can be detected</a:t>
+            </a:r>
+          </a:p>
+          <a:p>
+            <a:pPr lvl="1"/>
+            <a:r>
+              <a:rPr lang="en-US" sz="2800" dirty="0"/>
+              <a:t>Tables, faces, walls</a:t>
+            </a:r>
+          </a:p>
+          <a:p>
+            <a:r>
+              <a:rPr lang="en-US" dirty="0"/>
+              <a:t>Artificial Feature – objects that are engineered to be detected</a:t>
+            </a:r>
+          </a:p>
+          <a:p>
+            <a:pPr lvl="1"/>
+            <a:r>
+              <a:rPr lang="en-US" sz="2800" dirty="0"/>
+              <a:t>QR codes, IR reflectors</a:t>
+            </a:r>
+          </a:p>
+          <a:p>
+            <a:pPr lvl="1"/>
+            <a:endParaRPr lang="en-US" sz="2800" dirty="0"/>
+          </a:p>
+          <a:p>
+            <a:endParaRPr lang="en-US" dirty="0"/>
+          </a:p>
+        </p:txBody>
+      </p:sp>
+    </p:spTree>
+    <p:extLst>
+      <p:ext uri="{BB962C8B-B14F-4D97-AF65-F5344CB8AC3E}">
+        <p14:creationId xmlns:p14="http://schemas.microsoft.com/office/powerpoint/2010/main" val="1145564844"/>
+      </p:ext>
+    </p:extLst>
+  </p:cSld>
+  <p:clrMapOvr>
+    <a:masterClrMapping/>
+  </p:clrMapOvr>
+</p:sld>
+</file>
+
+<file path=ppt/slides/slide9.xml><?xml version="1.0" encoding="utf-8"?>
+<p:sld xmlns:a="http://schemas.openxmlformats.org/drawingml/2006/main" xmlns:r="http://schemas.openxmlformats.org/officeDocument/2006/relationships" xmlns:p="http://schemas.openxmlformats.org/presentationml/2006/main">
+  <p:cSld>
+    <p:spTree>
+      <p:nvGrpSpPr>
+        <p:cNvPr id="1" name=""/>
+        <p:cNvGrpSpPr/>
+        <p:nvPr/>
+      </p:nvGrpSpPr>
+      <p:grpSpPr>
+        <a:xfrm>
+          <a:off x="0" y="0"/>
+          <a:ext cx="0" cy="0"/>
+          <a:chOff x="0" y="0"/>
+          <a:chExt cx="0" cy="0"/>
+        </a:xfrm>
+      </p:grpSpPr>
+      <p:sp>
+        <p:nvSpPr>
+          <p:cNvPr id="2" name="Title 1">
+            <a:extLst>
+              <a:ext uri="{FF2B5EF4-FFF2-40B4-BE49-F238E27FC236}">
+                <a16:creationId xmlns:a16="http://schemas.microsoft.com/office/drawing/2014/main" id="{8E68C71C-322F-45A3-88D9-114D14CB792A}"/>
+              </a:ext>
+            </a:extLst>
+          </p:cNvPr>
+          <p:cNvSpPr>
+            <a:spLocks noGrp="1"/>
+          </p:cNvSpPr>
+          <p:nvPr>
+            <p:ph type="title"/>
+          </p:nvPr>
+        </p:nvSpPr>
+        <p:spPr/>
+        <p:txBody>
+          <a:bodyPr/>
+          <a:lstStyle/>
+          <a:p>
+            <a:r>
+              <a:rPr lang="en-US" dirty="0"/>
+              <a:t>The Perspective-n-Point problem</a:t>
+            </a:r>
+          </a:p>
+        </p:txBody>
+      </p:sp>
+      <p:sp>
+        <p:nvSpPr>
+          <p:cNvPr id="3" name="Content Placeholder 2">
+            <a:extLst>
+              <a:ext uri="{FF2B5EF4-FFF2-40B4-BE49-F238E27FC236}">
+                <a16:creationId xmlns:a16="http://schemas.microsoft.com/office/drawing/2014/main" id="{243DC83C-A06B-4137-9555-18491AF43A6A}"/>
+              </a:ext>
+            </a:extLst>
+          </p:cNvPr>
+          <p:cNvSpPr>
+            <a:spLocks noGrp="1"/>
+          </p:cNvSpPr>
+          <p:nvPr>
+            <p:ph idx="1"/>
+          </p:nvPr>
+        </p:nvSpPr>
+        <p:spPr/>
+        <p:txBody>
+          <a:bodyPr/>
+          <a:lstStyle/>
+          <a:p>
+            <a:r>
+              <a:rPr lang="en-US" dirty="0"/>
+              <a:t>A camera has 6 Degrees of freedom</a:t>
+            </a:r>
+          </a:p>
+          <a:p>
+            <a:r>
+              <a:rPr lang="en-US" dirty="0"/>
+              <a:t>Each point visible can account for 2 degrees of freedom</a:t>
+            </a:r>
+          </a:p>
+          <a:p>
+            <a:endParaRPr lang="en-US" dirty="0"/>
+          </a:p>
+        </p:txBody>
+      </p:sp>
+      <p:pic>
+        <p:nvPicPr>
+          <p:cNvPr id="4" name="Picture 3">
+            <a:extLst>
+              <a:ext uri="{FF2B5EF4-FFF2-40B4-BE49-F238E27FC236}">
+                <a16:creationId xmlns:a16="http://schemas.microsoft.com/office/drawing/2014/main" id="{D94F21C3-5622-4920-81CB-9EE468C252C6}"/>
+              </a:ext>
+            </a:extLst>
+          </p:cNvPr>
+          <p:cNvPicPr>
+            <a:picLocks noChangeAspect="1"/>
+          </p:cNvPicPr>
+          <p:nvPr/>
+        </p:nvPicPr>
+        <p:blipFill>
+          <a:blip r:embed="rId2"/>
+          <a:stretch>
+            <a:fillRect/>
+          </a:stretch>
+        </p:blipFill>
+        <p:spPr>
+          <a:xfrm>
+            <a:off x="-102579" y="3879273"/>
+            <a:ext cx="12336143" cy="2978727"/>
+          </a:xfrm>
+          <a:prstGeom prst="rect">
+            <a:avLst/>
+          </a:prstGeom>
+        </p:spPr>
+      </p:pic>
+    </p:spTree>
+    <p:extLst>
+      <p:ext uri="{BB962C8B-B14F-4D97-AF65-F5344CB8AC3E}">
+        <p14:creationId xmlns:p14="http://schemas.microsoft.com/office/powerpoint/2010/main" val="4163927978"/>
       </p:ext>
     </p:extLst>
   </p:cSld>

</xml_diff>

<commit_message>
Slides Chapter 9 Update 3
</commit_message>
<xml_diff>
--- a/slides/Chapter 9.pptx
+++ b/slides/Chapter 9.pptx
@@ -3538,11 +3538,7 @@
           <a:p>
             <a:r>
               <a:rPr lang="en-US" dirty="0"/>
-              <a:t>Panoramic stitching can be used to </a:t>
-            </a:r>
-            <a:r>
-              <a:rPr lang="en-US"/>
-              <a:t>get full 360 scan</a:t>
+              <a:t>Panoramic stitching can be used to get full 360 scan</a:t>
             </a:r>
           </a:p>
         </p:txBody>

</xml_diff>